<commit_message>
Add Flowchart to the table
</commit_message>
<xml_diff>
--- a/Manuscript/DAG of Prior.pptx
+++ b/Manuscript/DAG of Prior.pptx
@@ -104,6 +104,11 @@
       </a:defRPr>
     </a:lvl9pPr>
   </p:defaultTextStyle>
+  <p:extLst>
+    <p:ext uri="{EFAFB233-063F-42B5-8137-9DF3F51BA10A}">
+      <p15:sldGuideLst xmlns:p15="http://schemas.microsoft.com/office/powerpoint/2012/main"/>
+    </p:ext>
+  </p:extLst>
 </p:presentation>
 </file>
 
@@ -149,10 +154,9 @@
           </a:lstStyle>
           <a:p>
             <a:r>
-              <a:rPr lang="en-US" smtClean="0"/>
+              <a:rPr lang="en-US"/>
               <a:t>Click to edit Master title style</a:t>
             </a:r>
-            <a:endParaRPr lang="en-US"/>
           </a:p>
         </p:txBody>
       </p:sp>
@@ -214,10 +218,9 @@
           </a:lstStyle>
           <a:p>
             <a:r>
-              <a:rPr lang="en-US" smtClean="0"/>
+              <a:rPr lang="en-US"/>
               <a:t>Click to edit Master subtitle style</a:t>
             </a:r>
-            <a:endParaRPr lang="en-US"/>
           </a:p>
         </p:txBody>
       </p:sp>
@@ -238,7 +241,7 @@
           <a:p>
             <a:fld id="{52FB48E3-4608-499E-8B5F-AE02E0AE2245}" type="datetimeFigureOut">
               <a:rPr lang="en-US" smtClean="0"/>
-              <a:t>5/10/2021</a:t>
+              <a:t>5/17/21</a:t>
             </a:fld>
             <a:endParaRPr lang="en-US"/>
           </a:p>
@@ -332,10 +335,9 @@
           <a:lstStyle/>
           <a:p>
             <a:r>
-              <a:rPr lang="en-US" smtClean="0"/>
+              <a:rPr lang="en-US"/>
               <a:t>Click to edit Master title style</a:t>
             </a:r>
-            <a:endParaRPr lang="en-US"/>
           </a:p>
         </p:txBody>
       </p:sp>
@@ -356,38 +358,37 @@
           <a:p>
             <a:pPr lvl="0"/>
             <a:r>
-              <a:rPr lang="en-US" smtClean="0"/>
+              <a:rPr lang="en-US"/>
               <a:t>Edit Master text styles</a:t>
             </a:r>
           </a:p>
           <a:p>
             <a:pPr lvl="1"/>
             <a:r>
-              <a:rPr lang="en-US" smtClean="0"/>
+              <a:rPr lang="en-US"/>
               <a:t>Second level</a:t>
             </a:r>
           </a:p>
           <a:p>
             <a:pPr lvl="2"/>
             <a:r>
-              <a:rPr lang="en-US" smtClean="0"/>
+              <a:rPr lang="en-US"/>
               <a:t>Third level</a:t>
             </a:r>
           </a:p>
           <a:p>
             <a:pPr lvl="3"/>
             <a:r>
-              <a:rPr lang="en-US" smtClean="0"/>
+              <a:rPr lang="en-US"/>
               <a:t>Fourth level</a:t>
             </a:r>
           </a:p>
           <a:p>
             <a:pPr lvl="4"/>
             <a:r>
-              <a:rPr lang="en-US" smtClean="0"/>
+              <a:rPr lang="en-US"/>
               <a:t>Fifth level</a:t>
             </a:r>
-            <a:endParaRPr lang="en-US"/>
           </a:p>
         </p:txBody>
       </p:sp>
@@ -408,7 +409,7 @@
           <a:p>
             <a:fld id="{52FB48E3-4608-499E-8B5F-AE02E0AE2245}" type="datetimeFigureOut">
               <a:rPr lang="en-US" smtClean="0"/>
-              <a:t>5/10/2021</a:t>
+              <a:t>5/17/21</a:t>
             </a:fld>
             <a:endParaRPr lang="en-US"/>
           </a:p>
@@ -507,10 +508,9 @@
           <a:lstStyle/>
           <a:p>
             <a:r>
-              <a:rPr lang="en-US" smtClean="0"/>
+              <a:rPr lang="en-US"/>
               <a:t>Click to edit Master title style</a:t>
             </a:r>
-            <a:endParaRPr lang="en-US"/>
           </a:p>
         </p:txBody>
       </p:sp>
@@ -536,38 +536,37 @@
           <a:p>
             <a:pPr lvl="0"/>
             <a:r>
-              <a:rPr lang="en-US" smtClean="0"/>
+              <a:rPr lang="en-US"/>
               <a:t>Edit Master text styles</a:t>
             </a:r>
           </a:p>
           <a:p>
             <a:pPr lvl="1"/>
             <a:r>
-              <a:rPr lang="en-US" smtClean="0"/>
+              <a:rPr lang="en-US"/>
               <a:t>Second level</a:t>
             </a:r>
           </a:p>
           <a:p>
             <a:pPr lvl="2"/>
             <a:r>
-              <a:rPr lang="en-US" smtClean="0"/>
+              <a:rPr lang="en-US"/>
               <a:t>Third level</a:t>
             </a:r>
           </a:p>
           <a:p>
             <a:pPr lvl="3"/>
             <a:r>
-              <a:rPr lang="en-US" smtClean="0"/>
+              <a:rPr lang="en-US"/>
               <a:t>Fourth level</a:t>
             </a:r>
           </a:p>
           <a:p>
             <a:pPr lvl="4"/>
             <a:r>
-              <a:rPr lang="en-US" smtClean="0"/>
+              <a:rPr lang="en-US"/>
               <a:t>Fifth level</a:t>
             </a:r>
-            <a:endParaRPr lang="en-US"/>
           </a:p>
         </p:txBody>
       </p:sp>
@@ -588,7 +587,7 @@
           <a:p>
             <a:fld id="{52FB48E3-4608-499E-8B5F-AE02E0AE2245}" type="datetimeFigureOut">
               <a:rPr lang="en-US" smtClean="0"/>
-              <a:t>5/10/2021</a:t>
+              <a:t>5/17/21</a:t>
             </a:fld>
             <a:endParaRPr lang="en-US"/>
           </a:p>
@@ -682,10 +681,9 @@
           <a:lstStyle/>
           <a:p>
             <a:r>
-              <a:rPr lang="en-US" smtClean="0"/>
+              <a:rPr lang="en-US"/>
               <a:t>Click to edit Master title style</a:t>
             </a:r>
-            <a:endParaRPr lang="en-US"/>
           </a:p>
         </p:txBody>
       </p:sp>
@@ -706,38 +704,37 @@
           <a:p>
             <a:pPr lvl="0"/>
             <a:r>
-              <a:rPr lang="en-US" smtClean="0"/>
+              <a:rPr lang="en-US"/>
               <a:t>Edit Master text styles</a:t>
             </a:r>
           </a:p>
           <a:p>
             <a:pPr lvl="1"/>
             <a:r>
-              <a:rPr lang="en-US" smtClean="0"/>
+              <a:rPr lang="en-US"/>
               <a:t>Second level</a:t>
             </a:r>
           </a:p>
           <a:p>
             <a:pPr lvl="2"/>
             <a:r>
-              <a:rPr lang="en-US" smtClean="0"/>
+              <a:rPr lang="en-US"/>
               <a:t>Third level</a:t>
             </a:r>
           </a:p>
           <a:p>
             <a:pPr lvl="3"/>
             <a:r>
-              <a:rPr lang="en-US" smtClean="0"/>
+              <a:rPr lang="en-US"/>
               <a:t>Fourth level</a:t>
             </a:r>
           </a:p>
           <a:p>
             <a:pPr lvl="4"/>
             <a:r>
-              <a:rPr lang="en-US" smtClean="0"/>
+              <a:rPr lang="en-US"/>
               <a:t>Fifth level</a:t>
             </a:r>
-            <a:endParaRPr lang="en-US"/>
           </a:p>
         </p:txBody>
       </p:sp>
@@ -758,7 +755,7 @@
           <a:p>
             <a:fld id="{52FB48E3-4608-499E-8B5F-AE02E0AE2245}" type="datetimeFigureOut">
               <a:rPr lang="en-US" smtClean="0"/>
-              <a:t>5/10/2021</a:t>
+              <a:t>5/17/21</a:t>
             </a:fld>
             <a:endParaRPr lang="en-US"/>
           </a:p>
@@ -861,10 +858,9 @@
           </a:lstStyle>
           <a:p>
             <a:r>
-              <a:rPr lang="en-US" smtClean="0"/>
+              <a:rPr lang="en-US"/>
               <a:t>Click to edit Master title style</a:t>
             </a:r>
-            <a:endParaRPr lang="en-US"/>
           </a:p>
         </p:txBody>
       </p:sp>
@@ -981,7 +977,7 @@
           <a:p>
             <a:pPr lvl="0"/>
             <a:r>
-              <a:rPr lang="en-US" smtClean="0"/>
+              <a:rPr lang="en-US"/>
               <a:t>Edit Master text styles</a:t>
             </a:r>
           </a:p>
@@ -1004,7 +1000,7 @@
           <a:p>
             <a:fld id="{52FB48E3-4608-499E-8B5F-AE02E0AE2245}" type="datetimeFigureOut">
               <a:rPr lang="en-US" smtClean="0"/>
-              <a:t>5/10/2021</a:t>
+              <a:t>5/17/21</a:t>
             </a:fld>
             <a:endParaRPr lang="en-US"/>
           </a:p>
@@ -1098,10 +1094,9 @@
           <a:lstStyle/>
           <a:p>
             <a:r>
-              <a:rPr lang="en-US" smtClean="0"/>
+              <a:rPr lang="en-US"/>
               <a:t>Click to edit Master title style</a:t>
             </a:r>
-            <a:endParaRPr lang="en-US"/>
           </a:p>
         </p:txBody>
       </p:sp>
@@ -1127,38 +1122,37 @@
           <a:p>
             <a:pPr lvl="0"/>
             <a:r>
-              <a:rPr lang="en-US" smtClean="0"/>
+              <a:rPr lang="en-US"/>
               <a:t>Edit Master text styles</a:t>
             </a:r>
           </a:p>
           <a:p>
             <a:pPr lvl="1"/>
             <a:r>
-              <a:rPr lang="en-US" smtClean="0"/>
+              <a:rPr lang="en-US"/>
               <a:t>Second level</a:t>
             </a:r>
           </a:p>
           <a:p>
             <a:pPr lvl="2"/>
             <a:r>
-              <a:rPr lang="en-US" smtClean="0"/>
+              <a:rPr lang="en-US"/>
               <a:t>Third level</a:t>
             </a:r>
           </a:p>
           <a:p>
             <a:pPr lvl="3"/>
             <a:r>
-              <a:rPr lang="en-US" smtClean="0"/>
+              <a:rPr lang="en-US"/>
               <a:t>Fourth level</a:t>
             </a:r>
           </a:p>
           <a:p>
             <a:pPr lvl="4"/>
             <a:r>
-              <a:rPr lang="en-US" smtClean="0"/>
+              <a:rPr lang="en-US"/>
               <a:t>Fifth level</a:t>
             </a:r>
-            <a:endParaRPr lang="en-US"/>
           </a:p>
         </p:txBody>
       </p:sp>
@@ -1184,38 +1178,37 @@
           <a:p>
             <a:pPr lvl="0"/>
             <a:r>
-              <a:rPr lang="en-US" smtClean="0"/>
+              <a:rPr lang="en-US"/>
               <a:t>Edit Master text styles</a:t>
             </a:r>
           </a:p>
           <a:p>
             <a:pPr lvl="1"/>
             <a:r>
-              <a:rPr lang="en-US" smtClean="0"/>
+              <a:rPr lang="en-US"/>
               <a:t>Second level</a:t>
             </a:r>
           </a:p>
           <a:p>
             <a:pPr lvl="2"/>
             <a:r>
-              <a:rPr lang="en-US" smtClean="0"/>
+              <a:rPr lang="en-US"/>
               <a:t>Third level</a:t>
             </a:r>
           </a:p>
           <a:p>
             <a:pPr lvl="3"/>
             <a:r>
-              <a:rPr lang="en-US" smtClean="0"/>
+              <a:rPr lang="en-US"/>
               <a:t>Fourth level</a:t>
             </a:r>
           </a:p>
           <a:p>
             <a:pPr lvl="4"/>
             <a:r>
-              <a:rPr lang="en-US" smtClean="0"/>
+              <a:rPr lang="en-US"/>
               <a:t>Fifth level</a:t>
             </a:r>
-            <a:endParaRPr lang="en-US"/>
           </a:p>
         </p:txBody>
       </p:sp>
@@ -1236,7 +1229,7 @@
           <a:p>
             <a:fld id="{52FB48E3-4608-499E-8B5F-AE02E0AE2245}" type="datetimeFigureOut">
               <a:rPr lang="en-US" smtClean="0"/>
-              <a:t>5/10/2021</a:t>
+              <a:t>5/17/21</a:t>
             </a:fld>
             <a:endParaRPr lang="en-US"/>
           </a:p>
@@ -1335,10 +1328,9 @@
           <a:lstStyle/>
           <a:p>
             <a:r>
-              <a:rPr lang="en-US" smtClean="0"/>
+              <a:rPr lang="en-US"/>
               <a:t>Click to edit Master title style</a:t>
             </a:r>
-            <a:endParaRPr lang="en-US"/>
           </a:p>
         </p:txBody>
       </p:sp>
@@ -1401,7 +1393,7 @@
           <a:p>
             <a:pPr lvl="0"/>
             <a:r>
-              <a:rPr lang="en-US" smtClean="0"/>
+              <a:rPr lang="en-US"/>
               <a:t>Edit Master text styles</a:t>
             </a:r>
           </a:p>
@@ -1429,38 +1421,37 @@
           <a:p>
             <a:pPr lvl="0"/>
             <a:r>
-              <a:rPr lang="en-US" smtClean="0"/>
+              <a:rPr lang="en-US"/>
               <a:t>Edit Master text styles</a:t>
             </a:r>
           </a:p>
           <a:p>
             <a:pPr lvl="1"/>
             <a:r>
-              <a:rPr lang="en-US" smtClean="0"/>
+              <a:rPr lang="en-US"/>
               <a:t>Second level</a:t>
             </a:r>
           </a:p>
           <a:p>
             <a:pPr lvl="2"/>
             <a:r>
-              <a:rPr lang="en-US" smtClean="0"/>
+              <a:rPr lang="en-US"/>
               <a:t>Third level</a:t>
             </a:r>
           </a:p>
           <a:p>
             <a:pPr lvl="3"/>
             <a:r>
-              <a:rPr lang="en-US" smtClean="0"/>
+              <a:rPr lang="en-US"/>
               <a:t>Fourth level</a:t>
             </a:r>
           </a:p>
           <a:p>
             <a:pPr lvl="4"/>
             <a:r>
-              <a:rPr lang="en-US" smtClean="0"/>
+              <a:rPr lang="en-US"/>
               <a:t>Fifth level</a:t>
             </a:r>
-            <a:endParaRPr lang="en-US"/>
           </a:p>
         </p:txBody>
       </p:sp>
@@ -1523,7 +1514,7 @@
           <a:p>
             <a:pPr lvl="0"/>
             <a:r>
-              <a:rPr lang="en-US" smtClean="0"/>
+              <a:rPr lang="en-US"/>
               <a:t>Edit Master text styles</a:t>
             </a:r>
           </a:p>
@@ -1551,38 +1542,37 @@
           <a:p>
             <a:pPr lvl="0"/>
             <a:r>
-              <a:rPr lang="en-US" smtClean="0"/>
+              <a:rPr lang="en-US"/>
               <a:t>Edit Master text styles</a:t>
             </a:r>
           </a:p>
           <a:p>
             <a:pPr lvl="1"/>
             <a:r>
-              <a:rPr lang="en-US" smtClean="0"/>
+              <a:rPr lang="en-US"/>
               <a:t>Second level</a:t>
             </a:r>
           </a:p>
           <a:p>
             <a:pPr lvl="2"/>
             <a:r>
-              <a:rPr lang="en-US" smtClean="0"/>
+              <a:rPr lang="en-US"/>
               <a:t>Third level</a:t>
             </a:r>
           </a:p>
           <a:p>
             <a:pPr lvl="3"/>
             <a:r>
-              <a:rPr lang="en-US" smtClean="0"/>
+              <a:rPr lang="en-US"/>
               <a:t>Fourth level</a:t>
             </a:r>
           </a:p>
           <a:p>
             <a:pPr lvl="4"/>
             <a:r>
-              <a:rPr lang="en-US" smtClean="0"/>
+              <a:rPr lang="en-US"/>
               <a:t>Fifth level</a:t>
             </a:r>
-            <a:endParaRPr lang="en-US"/>
           </a:p>
         </p:txBody>
       </p:sp>
@@ -1603,7 +1593,7 @@
           <a:p>
             <a:fld id="{52FB48E3-4608-499E-8B5F-AE02E0AE2245}" type="datetimeFigureOut">
               <a:rPr lang="en-US" smtClean="0"/>
-              <a:t>5/10/2021</a:t>
+              <a:t>5/17/21</a:t>
             </a:fld>
             <a:endParaRPr lang="en-US"/>
           </a:p>
@@ -1697,10 +1687,9 @@
           <a:lstStyle/>
           <a:p>
             <a:r>
-              <a:rPr lang="en-US" smtClean="0"/>
+              <a:rPr lang="en-US"/>
               <a:t>Click to edit Master title style</a:t>
             </a:r>
-            <a:endParaRPr lang="en-US"/>
           </a:p>
         </p:txBody>
       </p:sp>
@@ -1721,7 +1710,7 @@
           <a:p>
             <a:fld id="{52FB48E3-4608-499E-8B5F-AE02E0AE2245}" type="datetimeFigureOut">
               <a:rPr lang="en-US" smtClean="0"/>
-              <a:t>5/10/2021</a:t>
+              <a:t>5/17/21</a:t>
             </a:fld>
             <a:endParaRPr lang="en-US"/>
           </a:p>
@@ -1816,7 +1805,7 @@
           <a:p>
             <a:fld id="{52FB48E3-4608-499E-8B5F-AE02E0AE2245}" type="datetimeFigureOut">
               <a:rPr lang="en-US" smtClean="0"/>
-              <a:t>5/10/2021</a:t>
+              <a:t>5/17/21</a:t>
             </a:fld>
             <a:endParaRPr lang="en-US"/>
           </a:p>
@@ -1919,10 +1908,9 @@
           </a:lstStyle>
           <a:p>
             <a:r>
-              <a:rPr lang="en-US" smtClean="0"/>
+              <a:rPr lang="en-US"/>
               <a:t>Click to edit Master title style</a:t>
             </a:r>
-            <a:endParaRPr lang="en-US"/>
           </a:p>
         </p:txBody>
       </p:sp>
@@ -1976,38 +1964,37 @@
           <a:p>
             <a:pPr lvl="0"/>
             <a:r>
-              <a:rPr lang="en-US" smtClean="0"/>
+              <a:rPr lang="en-US"/>
               <a:t>Edit Master text styles</a:t>
             </a:r>
           </a:p>
           <a:p>
             <a:pPr lvl="1"/>
             <a:r>
-              <a:rPr lang="en-US" smtClean="0"/>
+              <a:rPr lang="en-US"/>
               <a:t>Second level</a:t>
             </a:r>
           </a:p>
           <a:p>
             <a:pPr lvl="2"/>
             <a:r>
-              <a:rPr lang="en-US" smtClean="0"/>
+              <a:rPr lang="en-US"/>
               <a:t>Third level</a:t>
             </a:r>
           </a:p>
           <a:p>
             <a:pPr lvl="3"/>
             <a:r>
-              <a:rPr lang="en-US" smtClean="0"/>
+              <a:rPr lang="en-US"/>
               <a:t>Fourth level</a:t>
             </a:r>
           </a:p>
           <a:p>
             <a:pPr lvl="4"/>
             <a:r>
-              <a:rPr lang="en-US" smtClean="0"/>
+              <a:rPr lang="en-US"/>
               <a:t>Fifth level</a:t>
             </a:r>
-            <a:endParaRPr lang="en-US"/>
           </a:p>
         </p:txBody>
       </p:sp>
@@ -2070,7 +2057,7 @@
           <a:p>
             <a:pPr lvl="0"/>
             <a:r>
-              <a:rPr lang="en-US" smtClean="0"/>
+              <a:rPr lang="en-US"/>
               <a:t>Edit Master text styles</a:t>
             </a:r>
           </a:p>
@@ -2093,7 +2080,7 @@
           <a:p>
             <a:fld id="{52FB48E3-4608-499E-8B5F-AE02E0AE2245}" type="datetimeFigureOut">
               <a:rPr lang="en-US" smtClean="0"/>
-              <a:t>5/10/2021</a:t>
+              <a:t>5/17/21</a:t>
             </a:fld>
             <a:endParaRPr lang="en-US"/>
           </a:p>
@@ -2196,10 +2183,9 @@
           </a:lstStyle>
           <a:p>
             <a:r>
-              <a:rPr lang="en-US" smtClean="0"/>
+              <a:rPr lang="en-US"/>
               <a:t>Click to edit Master title style</a:t>
             </a:r>
-            <a:endParaRPr lang="en-US"/>
           </a:p>
         </p:txBody>
       </p:sp>
@@ -2323,7 +2309,7 @@
           <a:p>
             <a:pPr lvl="0"/>
             <a:r>
-              <a:rPr lang="en-US" smtClean="0"/>
+              <a:rPr lang="en-US"/>
               <a:t>Edit Master text styles</a:t>
             </a:r>
           </a:p>
@@ -2346,7 +2332,7 @@
           <a:p>
             <a:fld id="{52FB48E3-4608-499E-8B5F-AE02E0AE2245}" type="datetimeFigureOut">
               <a:rPr lang="en-US" smtClean="0"/>
-              <a:t>5/10/2021</a:t>
+              <a:t>5/17/21</a:t>
             </a:fld>
             <a:endParaRPr lang="en-US"/>
           </a:p>
@@ -2455,10 +2441,9 @@
           <a:lstStyle/>
           <a:p>
             <a:r>
-              <a:rPr lang="en-US" smtClean="0"/>
+              <a:rPr lang="en-US"/>
               <a:t>Click to edit Master title style</a:t>
             </a:r>
-            <a:endParaRPr lang="en-US"/>
           </a:p>
         </p:txBody>
       </p:sp>
@@ -2489,38 +2474,37 @@
           <a:p>
             <a:pPr lvl="0"/>
             <a:r>
-              <a:rPr lang="en-US" smtClean="0"/>
+              <a:rPr lang="en-US"/>
               <a:t>Edit Master text styles</a:t>
             </a:r>
           </a:p>
           <a:p>
             <a:pPr lvl="1"/>
             <a:r>
-              <a:rPr lang="en-US" smtClean="0"/>
+              <a:rPr lang="en-US"/>
               <a:t>Second level</a:t>
             </a:r>
           </a:p>
           <a:p>
             <a:pPr lvl="2"/>
             <a:r>
-              <a:rPr lang="en-US" smtClean="0"/>
+              <a:rPr lang="en-US"/>
               <a:t>Third level</a:t>
             </a:r>
           </a:p>
           <a:p>
             <a:pPr lvl="3"/>
             <a:r>
-              <a:rPr lang="en-US" smtClean="0"/>
+              <a:rPr lang="en-US"/>
               <a:t>Fourth level</a:t>
             </a:r>
           </a:p>
           <a:p>
             <a:pPr lvl="4"/>
             <a:r>
-              <a:rPr lang="en-US" smtClean="0"/>
+              <a:rPr lang="en-US"/>
               <a:t>Fifth level</a:t>
             </a:r>
-            <a:endParaRPr lang="en-US"/>
           </a:p>
         </p:txBody>
       </p:sp>
@@ -2559,7 +2543,7 @@
           <a:p>
             <a:fld id="{52FB48E3-4608-499E-8B5F-AE02E0AE2245}" type="datetimeFigureOut">
               <a:rPr lang="en-US" smtClean="0"/>
-              <a:t>5/10/2021</a:t>
+              <a:t>5/17/21</a:t>
             </a:fld>
             <a:endParaRPr lang="en-US"/>
           </a:p>
@@ -2964,8 +2948,8 @@
           <a:chExt cx="0" cy="0"/>
         </a:xfrm>
       </p:grpSpPr>
-      <mc:AlternateContent xmlns:mc="http://schemas.openxmlformats.org/markup-compatibility/2006">
-        <mc:Choice xmlns:a14="http://schemas.microsoft.com/office/drawing/2010/main" Requires="a14">
+      <mc:AlternateContent xmlns:mc="http://schemas.openxmlformats.org/markup-compatibility/2006" xmlns:a14="http://schemas.microsoft.com/office/drawing/2010/main">
+        <mc:Choice Requires="a14">
           <p:sp>
             <p:nvSpPr>
               <p:cNvPr id="5" name="Oval 4"/>
@@ -3119,7 +3103,7 @@
             </p:txBody>
           </p:sp>
         </mc:Choice>
-        <mc:Fallback>
+        <mc:Fallback xmlns="">
           <p:sp>
             <p:nvSpPr>
               <p:cNvPr id="5" name="Oval 4"/>
@@ -3168,7 +3152,7 @@
             </p:nvSpPr>
             <p:spPr>
               <a:xfrm>
-                <a:off x="2782766" y="4308231"/>
+                <a:off x="2782766" y="4465656"/>
                 <a:ext cx="5794130" cy="545123"/>
               </a:xfrm>
               <a:prstGeom prst="rect">
@@ -3290,13 +3274,7 @@
                                 <a:rPr lang="en-US" b="0" i="1" smtClean="0">
                                   <a:latin typeface="Cambria Math" panose="02040503050406030204" pitchFamily="18" charset="0"/>
                                 </a:rPr>
-                                <m:t> </m:t>
-                              </m:r>
-                              <m:r>
-                                <a:rPr lang="en-US" b="0" i="1" smtClean="0">
-                                  <a:latin typeface="Cambria Math" panose="02040503050406030204" pitchFamily="18" charset="0"/>
-                                </a:rPr>
-                                <m:t>, </m:t>
+                                <m:t> , </m:t>
                               </m:r>
                               <m:sSubSup>
                                 <m:sSubSupPr>
@@ -3497,7 +3475,7 @@
             </p:nvSpPr>
             <p:spPr>
               <a:xfrm>
-                <a:off x="2782766" y="4308231"/>
+                <a:off x="2782766" y="4465656"/>
                 <a:ext cx="5794130" cy="545123"/>
               </a:xfrm>
               <a:prstGeom prst="rect">
@@ -3534,7 +3512,7 @@
         <p:spPr>
           <a:xfrm>
             <a:off x="580292" y="852854"/>
-            <a:ext cx="4026877" cy="3077308"/>
+            <a:ext cx="4308231" cy="2963008"/>
           </a:xfrm>
           <a:prstGeom prst="rect">
             <a:avLst/>
@@ -3635,7 +3613,7 @@
             </p:nvSpPr>
             <p:spPr>
               <a:xfrm>
-                <a:off x="2593730" y="1116624"/>
+                <a:off x="1327638" y="1002323"/>
                 <a:ext cx="2497016" cy="518746"/>
               </a:xfrm>
               <a:prstGeom prst="ellipse">
@@ -3763,7 +3741,7 @@
             </p:nvSpPr>
             <p:spPr>
               <a:xfrm>
-                <a:off x="2593730" y="1116624"/>
+                <a:off x="1327638" y="1002323"/>
                 <a:ext cx="2497016" cy="518746"/>
               </a:xfrm>
               <a:prstGeom prst="ellipse">
@@ -3801,8 +3779,8 @@
             </p:nvSpPr>
             <p:spPr>
               <a:xfrm>
-                <a:off x="4730262" y="382466"/>
-                <a:ext cx="1758461" cy="373672"/>
+                <a:off x="5394505" y="1002323"/>
+                <a:ext cx="1063870" cy="373672"/>
               </a:xfrm>
               <a:prstGeom prst="rect">
                 <a:avLst/>
@@ -3884,8 +3862,8 @@
             </p:nvSpPr>
             <p:spPr>
               <a:xfrm>
-                <a:off x="4730262" y="382466"/>
-                <a:ext cx="1758461" cy="373672"/>
+                <a:off x="5394505" y="1002323"/>
+                <a:ext cx="1063870" cy="373672"/>
               </a:xfrm>
               <a:prstGeom prst="rect">
                 <a:avLst/>
@@ -3893,7 +3871,7 @@
               <a:blipFill>
                 <a:blip r:embed="rId5"/>
                 <a:stretch>
-                  <a:fillRect b="-11111"/>
+                  <a:fillRect b="-12903"/>
                 </a:stretch>
               </a:blipFill>
             </p:spPr>
@@ -3922,8 +3900,8 @@
             </p:nvSpPr>
             <p:spPr>
               <a:xfrm>
-                <a:off x="1310054" y="1943100"/>
-                <a:ext cx="2743200" cy="782515"/>
+                <a:off x="1136155" y="1792462"/>
+                <a:ext cx="2879981" cy="985907"/>
               </a:xfrm>
               <a:prstGeom prst="ellipse">
                 <a:avLst/>
@@ -3951,46 +3929,61 @@
               <a:p>
                 <a:pPr algn="ctr"/>
                 <a14:m>
+                  <m:oMathPara xmlns:m="http://schemas.openxmlformats.org/officeDocument/2006/math">
+                    <m:oMathParaPr>
+                      <m:jc m:val="centerGroup"/>
+                    </m:oMathParaPr>
+                    <m:oMath xmlns:m="http://schemas.openxmlformats.org/officeDocument/2006/math">
+                      <m:sSubSup>
+                        <m:sSubSupPr>
+                          <m:ctrlPr>
+                            <a:rPr lang="en-US" i="1" dirty="0" smtClean="0">
+                              <a:latin typeface="Cambria Math" panose="02040503050406030204" pitchFamily="18" charset="0"/>
+                            </a:rPr>
+                          </m:ctrlPr>
+                        </m:sSubSupPr>
+                        <m:e>
+                          <m:r>
+                            <a:rPr lang="en-US" i="1" dirty="0" smtClean="0">
+                              <a:latin typeface="Cambria Math" panose="02040503050406030204" pitchFamily="18" charset="0"/>
+                            </a:rPr>
+                            <m:t>𝛾</m:t>
+                          </m:r>
+                        </m:e>
+                        <m:sub>
+                          <m:r>
+                            <a:rPr lang="en-US" i="1" dirty="0" smtClean="0">
+                              <a:latin typeface="Cambria Math" panose="02040503050406030204" pitchFamily="18" charset="0"/>
+                            </a:rPr>
+                            <m:t>𝑗</m:t>
+                          </m:r>
+                        </m:sub>
+                        <m:sup>
+                          <m:r>
+                            <a:rPr lang="en-US" i="1" dirty="0" smtClean="0">
+                              <a:latin typeface="Cambria Math" panose="02040503050406030204" pitchFamily="18" charset="0"/>
+                            </a:rPr>
+                            <m:t>0</m:t>
+                          </m:r>
+                        </m:sup>
+                      </m:sSubSup>
+                      <m:r>
+                        <a:rPr lang="en-US" b="0" i="1" dirty="0" smtClean="0">
+                          <a:latin typeface="Cambria Math" panose="02040503050406030204" pitchFamily="18" charset="0"/>
+                        </a:rPr>
+                        <m:t>∼</m:t>
+                      </m:r>
+                    </m:oMath>
+                  </m:oMathPara>
+                </a14:m>
+                <a:endParaRPr lang="en-US" b="0" i="1" dirty="0">
+                  <a:latin typeface="Cambria Math" panose="02040503050406030204" pitchFamily="18" charset="0"/>
+                </a:endParaRPr>
+              </a:p>
+              <a:p>
+                <a:pPr algn="ctr"/>
+                <a14:m>
                   <m:oMath xmlns:m="http://schemas.openxmlformats.org/officeDocument/2006/math">
-                    <m:sSubSup>
-                      <m:sSubSupPr>
-                        <m:ctrlPr>
-                          <a:rPr lang="en-US" i="1" dirty="0" smtClean="0">
-                            <a:latin typeface="Cambria Math" panose="02040503050406030204" pitchFamily="18" charset="0"/>
-                          </a:rPr>
-                        </m:ctrlPr>
-                      </m:sSubSupPr>
-                      <m:e>
-                        <m:r>
-                          <a:rPr lang="en-US" i="1" dirty="0" smtClean="0">
-                            <a:latin typeface="Cambria Math" panose="02040503050406030204" pitchFamily="18" charset="0"/>
-                          </a:rPr>
-                          <m:t>𝛾</m:t>
-                        </m:r>
-                      </m:e>
-                      <m:sub>
-                        <m:r>
-                          <a:rPr lang="en-US" i="1" dirty="0" smtClean="0">
-                            <a:latin typeface="Cambria Math" panose="02040503050406030204" pitchFamily="18" charset="0"/>
-                          </a:rPr>
-                          <m:t>𝑗</m:t>
-                        </m:r>
-                      </m:sub>
-                      <m:sup>
-                        <m:r>
-                          <a:rPr lang="en-US" i="1" dirty="0" smtClean="0">
-                            <a:latin typeface="Cambria Math" panose="02040503050406030204" pitchFamily="18" charset="0"/>
-                          </a:rPr>
-                          <m:t>0</m:t>
-                        </m:r>
-                      </m:sup>
-                    </m:sSubSup>
-                    <m:r>
-                      <a:rPr lang="en-US" b="0" i="1" dirty="0" smtClean="0">
-                        <a:latin typeface="Cambria Math" panose="02040503050406030204" pitchFamily="18" charset="0"/>
-                      </a:rPr>
-                      <m:t>∼</m:t>
-                    </m:r>
                     <m:r>
                       <a:rPr lang="en-US" b="0" i="1" dirty="0" smtClean="0">
                         <a:latin typeface="Cambria Math" panose="02040503050406030204" pitchFamily="18" charset="0"/>
@@ -4039,17 +4032,16 @@
                   </m:oMath>
                 </a14:m>
                 <a:r>
-                  <a:rPr lang="en-US" b="0" dirty="0" smtClean="0"/>
+                  <a:rPr lang="en-US" b="0" dirty="0"/>
                   <a:t>)</a:t>
                 </a:r>
               </a:p>
               <a:p>
                 <a:pPr algn="ctr"/>
                 <a:r>
-                  <a:rPr lang="en-US" dirty="0" smtClean="0"/>
+                  <a:rPr lang="en-US" dirty="0"/>
                   <a:t> </a:t>
                 </a:r>
-                <a:endParaRPr lang="en-US" dirty="0"/>
               </a:p>
             </p:txBody>
           </p:sp>
@@ -4065,8 +4057,8 @@
             </p:nvSpPr>
             <p:spPr>
               <a:xfrm>
-                <a:off x="1310054" y="1943100"/>
-                <a:ext cx="2743200" cy="782515"/>
+                <a:off x="1136155" y="1792462"/>
+                <a:ext cx="2879981" cy="985907"/>
               </a:xfrm>
               <a:prstGeom prst="ellipse">
                 <a:avLst/>
@@ -4074,7 +4066,7 @@
               <a:blipFill>
                 <a:blip r:embed="rId6"/>
                 <a:stretch>
-                  <a:fillRect t="-7692"/>
+                  <a:fillRect/>
                 </a:stretch>
               </a:blipFill>
             </p:spPr>
@@ -4103,8 +4095,8 @@
             </p:nvSpPr>
             <p:spPr>
               <a:xfrm>
-                <a:off x="422031" y="3200400"/>
-                <a:ext cx="4308231" cy="685800"/>
+                <a:off x="659421" y="3049762"/>
+                <a:ext cx="4149971" cy="685800"/>
               </a:xfrm>
               <a:prstGeom prst="ellipse">
                 <a:avLst/>
@@ -4176,6 +4168,21 @@
                         </a:rPr>
                         <m:t>∼</m:t>
                       </m:r>
+                    </m:oMath>
+                  </m:oMathPara>
+                </a14:m>
+                <a:endParaRPr lang="en-US" i="1" dirty="0">
+                  <a:latin typeface="Cambria Math" panose="02040503050406030204" pitchFamily="18" charset="0"/>
+                </a:endParaRPr>
+              </a:p>
+              <a:p>
+                <a:pPr algn="ctr"/>
+                <a14:m>
+                  <m:oMathPara xmlns:m="http://schemas.openxmlformats.org/officeDocument/2006/math">
+                    <m:oMathParaPr>
+                      <m:jc m:val="centerGroup"/>
+                    </m:oMathParaPr>
+                    <m:oMath xmlns:m="http://schemas.openxmlformats.org/officeDocument/2006/math">
                       <m:r>
                         <a:rPr lang="en-US" b="0" i="1" dirty="0" smtClean="0">
                           <a:latin typeface="Cambria Math" panose="02040503050406030204" pitchFamily="18" charset="0"/>
@@ -4358,8 +4365,8 @@
             </p:nvSpPr>
             <p:spPr>
               <a:xfrm>
-                <a:off x="422031" y="3200400"/>
-                <a:ext cx="4308231" cy="685800"/>
+                <a:off x="659421" y="3049762"/>
+                <a:ext cx="4149971" cy="685800"/>
               </a:xfrm>
               <a:prstGeom prst="ellipse">
                 <a:avLst/>
@@ -4367,7 +4374,7 @@
               <a:blipFill>
                 <a:blip r:embed="rId7"/>
                 <a:stretch>
-                  <a:fillRect b="-7826"/>
+                  <a:fillRect b="-8929"/>
                 </a:stretch>
               </a:blipFill>
             </p:spPr>
@@ -4396,8 +4403,8 @@
             </p:nvSpPr>
             <p:spPr>
               <a:xfrm>
-                <a:off x="5147896" y="2655277"/>
-                <a:ext cx="1063869" cy="439615"/>
+                <a:off x="5455202" y="3172854"/>
+                <a:ext cx="1030181" cy="439615"/>
               </a:xfrm>
               <a:prstGeom prst="rect">
                 <a:avLst/>
@@ -4517,8 +4524,8 @@
             </p:nvSpPr>
             <p:spPr>
               <a:xfrm>
-                <a:off x="5147896" y="2655277"/>
-                <a:ext cx="1063869" cy="439615"/>
+                <a:off x="5455202" y="3172854"/>
+                <a:ext cx="1030181" cy="439615"/>
               </a:xfrm>
               <a:prstGeom prst="rect">
                 <a:avLst/>
@@ -4526,7 +4533,7 @@
               <a:blipFill>
                 <a:blip r:embed="rId8"/>
                 <a:stretch>
-                  <a:fillRect b="-1351"/>
+                  <a:fillRect b="-2703"/>
                 </a:stretch>
               </a:blipFill>
             </p:spPr>
@@ -4555,8 +4562,8 @@
             </p:nvSpPr>
             <p:spPr>
               <a:xfrm>
-                <a:off x="9196753" y="1046286"/>
-                <a:ext cx="2497016" cy="518746"/>
+                <a:off x="7860601" y="1078394"/>
+                <a:ext cx="2848151" cy="518746"/>
               </a:xfrm>
               <a:prstGeom prst="ellipse">
                 <a:avLst/>
@@ -4676,8 +4683,8 @@
             </p:nvSpPr>
             <p:spPr>
               <a:xfrm>
-                <a:off x="9196753" y="1046286"/>
-                <a:ext cx="2497016" cy="518746"/>
+                <a:off x="7860601" y="1078394"/>
+                <a:ext cx="2848151" cy="518746"/>
               </a:xfrm>
               <a:prstGeom prst="ellipse">
                 <a:avLst/>
@@ -4685,7 +4692,7 @@
               <a:blipFill>
                 <a:blip r:embed="rId9"/>
                 <a:stretch>
-                  <a:fillRect b="-26437"/>
+                  <a:fillRect/>
                 </a:stretch>
               </a:blipFill>
             </p:spPr>
@@ -4714,7 +4721,7 @@
             </p:nvSpPr>
             <p:spPr>
               <a:xfrm>
-                <a:off x="7913077" y="1872762"/>
+                <a:off x="7913076" y="1972343"/>
                 <a:ext cx="2743200" cy="782515"/>
               </a:xfrm>
               <a:prstGeom prst="ellipse">
@@ -4743,39 +4750,54 @@
               <a:p>
                 <a:pPr algn="ctr"/>
                 <a14:m>
+                  <m:oMathPara xmlns:m="http://schemas.openxmlformats.org/officeDocument/2006/math">
+                    <m:oMathParaPr>
+                      <m:jc m:val="centerGroup"/>
+                    </m:oMathParaPr>
+                    <m:oMath xmlns:m="http://schemas.openxmlformats.org/officeDocument/2006/math">
+                      <m:sSubSup>
+                        <m:sSubSupPr>
+                          <m:ctrlPr>
+                            <a:rPr lang="en-US" i="1" dirty="0" smtClean="0">
+                              <a:latin typeface="Cambria Math" panose="02040503050406030204" pitchFamily="18" charset="0"/>
+                            </a:rPr>
+                          </m:ctrlPr>
+                        </m:sSubSupPr>
+                        <m:e>
+                          <m:r>
+                            <a:rPr lang="en-US" i="1" dirty="0" smtClean="0">
+                              <a:latin typeface="Cambria Math" panose="02040503050406030204" pitchFamily="18" charset="0"/>
+                            </a:rPr>
+                            <m:t>𝛾</m:t>
+                          </m:r>
+                        </m:e>
+                        <m:sub>
+                          <m:r>
+                            <a:rPr lang="en-US" i="1" dirty="0" smtClean="0">
+                              <a:latin typeface="Cambria Math" panose="02040503050406030204" pitchFamily="18" charset="0"/>
+                            </a:rPr>
+                            <m:t>𝑗</m:t>
+                          </m:r>
+                        </m:sub>
+                        <m:sup/>
+                      </m:sSubSup>
+                      <m:r>
+                        <a:rPr lang="en-US" b="0" i="1" dirty="0" smtClean="0">
+                          <a:latin typeface="Cambria Math" panose="02040503050406030204" pitchFamily="18" charset="0"/>
+                        </a:rPr>
+                        <m:t>∼</m:t>
+                      </m:r>
+                    </m:oMath>
+                  </m:oMathPara>
+                </a14:m>
+                <a:endParaRPr lang="en-US" b="0" i="1" dirty="0">
+                  <a:latin typeface="Cambria Math" panose="02040503050406030204" pitchFamily="18" charset="0"/>
+                </a:endParaRPr>
+              </a:p>
+              <a:p>
+                <a:pPr algn="ctr"/>
+                <a14:m>
                   <m:oMath xmlns:m="http://schemas.openxmlformats.org/officeDocument/2006/math">
-                    <m:sSubSup>
-                      <m:sSubSupPr>
-                        <m:ctrlPr>
-                          <a:rPr lang="en-US" i="1" dirty="0" smtClean="0">
-                            <a:latin typeface="Cambria Math" panose="02040503050406030204" pitchFamily="18" charset="0"/>
-                          </a:rPr>
-                        </m:ctrlPr>
-                      </m:sSubSupPr>
-                      <m:e>
-                        <m:r>
-                          <a:rPr lang="en-US" i="1" dirty="0" smtClean="0">
-                            <a:latin typeface="Cambria Math" panose="02040503050406030204" pitchFamily="18" charset="0"/>
-                          </a:rPr>
-                          <m:t>𝛾</m:t>
-                        </m:r>
-                      </m:e>
-                      <m:sub>
-                        <m:r>
-                          <a:rPr lang="en-US" i="1" dirty="0" smtClean="0">
-                            <a:latin typeface="Cambria Math" panose="02040503050406030204" pitchFamily="18" charset="0"/>
-                          </a:rPr>
-                          <m:t>𝑗</m:t>
-                        </m:r>
-                      </m:sub>
-                      <m:sup/>
-                    </m:sSubSup>
-                    <m:r>
-                      <a:rPr lang="en-US" b="0" i="1" dirty="0" smtClean="0">
-                        <a:latin typeface="Cambria Math" panose="02040503050406030204" pitchFamily="18" charset="0"/>
-                      </a:rPr>
-                      <m:t>∼</m:t>
-                    </m:r>
                     <m:r>
                       <a:rPr lang="en-US" b="0" i="1" dirty="0" smtClean="0">
                         <a:latin typeface="Cambria Math" panose="02040503050406030204" pitchFamily="18" charset="0"/>
@@ -4824,17 +4846,16 @@
                   </m:oMath>
                 </a14:m>
                 <a:r>
-                  <a:rPr lang="en-US" b="0" dirty="0" smtClean="0"/>
+                  <a:rPr lang="en-US" b="0" dirty="0"/>
                   <a:t>)</a:t>
                 </a:r>
               </a:p>
               <a:p>
                 <a:pPr algn="ctr"/>
                 <a:r>
-                  <a:rPr lang="en-US" dirty="0" smtClean="0"/>
+                  <a:rPr lang="en-US" dirty="0"/>
                   <a:t> </a:t>
                 </a:r>
-                <a:endParaRPr lang="en-US" dirty="0"/>
               </a:p>
             </p:txBody>
           </p:sp>
@@ -4850,7 +4871,7 @@
             </p:nvSpPr>
             <p:spPr>
               <a:xfrm>
-                <a:off x="7913077" y="1872762"/>
+                <a:off x="7913076" y="1972343"/>
                 <a:ext cx="2743200" cy="782515"/>
               </a:xfrm>
               <a:prstGeom prst="ellipse">
@@ -4960,6 +4981,21 @@
                         </a:rPr>
                         <m:t>∼</m:t>
                       </m:r>
+                    </m:oMath>
+                  </m:oMathPara>
+                </a14:m>
+                <a:endParaRPr lang="en-US" i="1" dirty="0">
+                  <a:latin typeface="Cambria Math" panose="02040503050406030204" pitchFamily="18" charset="0"/>
+                </a:endParaRPr>
+              </a:p>
+              <a:p>
+                <a:pPr algn="ctr"/>
+                <a14:m>
+                  <m:oMathPara xmlns:m="http://schemas.openxmlformats.org/officeDocument/2006/math">
+                    <m:oMathParaPr>
+                      <m:jc m:val="centerGroup"/>
+                    </m:oMathParaPr>
+                    <m:oMath xmlns:m="http://schemas.openxmlformats.org/officeDocument/2006/math">
                       <m:r>
                         <a:rPr lang="en-US" b="0" i="1" dirty="0" smtClean="0">
                           <a:latin typeface="Cambria Math" panose="02040503050406030204" pitchFamily="18" charset="0"/>
@@ -5151,7 +5187,7 @@
               <a:blipFill>
                 <a:blip r:embed="rId11"/>
                 <a:stretch>
-                  <a:fillRect b="-9565"/>
+                  <a:fillRect b="-10714"/>
                 </a:stretch>
               </a:blipFill>
             </p:spPr>
@@ -5170,6 +5206,471 @@
           </p:sp>
         </mc:Fallback>
       </mc:AlternateContent>
+      <p:cxnSp>
+        <p:nvCxnSpPr>
+          <p:cNvPr id="17" name="Straight Arrow Connector 16">
+            <a:extLst>
+              <a:ext uri="{FF2B5EF4-FFF2-40B4-BE49-F238E27FC236}">
+                <a16:creationId xmlns:a16="http://schemas.microsoft.com/office/drawing/2014/main" id="{3C769733-DA15-3D45-9846-A19813AE8219}"/>
+              </a:ext>
+            </a:extLst>
+          </p:cNvPr>
+          <p:cNvCxnSpPr>
+            <a:stCxn id="10" idx="1"/>
+            <a:endCxn id="9" idx="6"/>
+          </p:cNvCxnSpPr>
+          <p:nvPr/>
+        </p:nvCxnSpPr>
+        <p:spPr>
+          <a:xfrm flipH="1">
+            <a:off x="3824654" y="1189159"/>
+            <a:ext cx="1569851" cy="72537"/>
+          </a:xfrm>
+          <a:prstGeom prst="straightConnector1">
+            <a:avLst/>
+          </a:prstGeom>
+          <a:ln>
+            <a:tailEnd type="triangle"/>
+          </a:ln>
+        </p:spPr>
+        <p:style>
+          <a:lnRef idx="1">
+            <a:schemeClr val="accent1"/>
+          </a:lnRef>
+          <a:fillRef idx="0">
+            <a:schemeClr val="accent1"/>
+          </a:fillRef>
+          <a:effectRef idx="0">
+            <a:schemeClr val="accent1"/>
+          </a:effectRef>
+          <a:fontRef idx="minor">
+            <a:schemeClr val="tx1"/>
+          </a:fontRef>
+        </p:style>
+      </p:cxnSp>
+      <p:cxnSp>
+        <p:nvCxnSpPr>
+          <p:cNvPr id="19" name="Straight Arrow Connector 18">
+            <a:extLst>
+              <a:ext uri="{FF2B5EF4-FFF2-40B4-BE49-F238E27FC236}">
+                <a16:creationId xmlns:a16="http://schemas.microsoft.com/office/drawing/2014/main" id="{2EF82034-60DB-F14A-8CB8-56729467D29A}"/>
+              </a:ext>
+            </a:extLst>
+          </p:cNvPr>
+          <p:cNvCxnSpPr>
+            <a:stCxn id="10" idx="3"/>
+            <a:endCxn id="14" idx="2"/>
+          </p:cNvCxnSpPr>
+          <p:nvPr/>
+        </p:nvCxnSpPr>
+        <p:spPr>
+          <a:xfrm>
+            <a:off x="6458375" y="1189159"/>
+            <a:ext cx="1402226" cy="148608"/>
+          </a:xfrm>
+          <a:prstGeom prst="straightConnector1">
+            <a:avLst/>
+          </a:prstGeom>
+          <a:ln w="9525" cap="flat" cmpd="sng" algn="ctr">
+            <a:solidFill>
+              <a:schemeClr val="accent1"/>
+            </a:solidFill>
+            <a:prstDash val="solid"/>
+            <a:round/>
+            <a:headEnd type="none" w="med" len="med"/>
+            <a:tailEnd type="arrow" w="med" len="med"/>
+          </a:ln>
+        </p:spPr>
+        <p:style>
+          <a:lnRef idx="0">
+            <a:scrgbClr r="0" g="0" b="0"/>
+          </a:lnRef>
+          <a:fillRef idx="0">
+            <a:scrgbClr r="0" g="0" b="0"/>
+          </a:fillRef>
+          <a:effectRef idx="0">
+            <a:scrgbClr r="0" g="0" b="0"/>
+          </a:effectRef>
+          <a:fontRef idx="minor">
+            <a:schemeClr val="tx1"/>
+          </a:fontRef>
+        </p:style>
+      </p:cxnSp>
+      <p:cxnSp>
+        <p:nvCxnSpPr>
+          <p:cNvPr id="21" name="Straight Arrow Connector 20">
+            <a:extLst>
+              <a:ext uri="{FF2B5EF4-FFF2-40B4-BE49-F238E27FC236}">
+                <a16:creationId xmlns:a16="http://schemas.microsoft.com/office/drawing/2014/main" id="{C911603C-B563-1A42-A79F-A34836EDEF07}"/>
+              </a:ext>
+            </a:extLst>
+          </p:cNvPr>
+          <p:cNvCxnSpPr>
+            <a:stCxn id="13" idx="1"/>
+          </p:cNvCxnSpPr>
+          <p:nvPr/>
+        </p:nvCxnSpPr>
+        <p:spPr>
+          <a:xfrm flipH="1">
+            <a:off x="4809392" y="3392662"/>
+            <a:ext cx="645810" cy="36338"/>
+          </a:xfrm>
+          <a:prstGeom prst="straightConnector1">
+            <a:avLst/>
+          </a:prstGeom>
+          <a:ln>
+            <a:tailEnd type="triangle"/>
+          </a:ln>
+        </p:spPr>
+        <p:style>
+          <a:lnRef idx="1">
+            <a:schemeClr val="accent1"/>
+          </a:lnRef>
+          <a:fillRef idx="0">
+            <a:schemeClr val="accent1"/>
+          </a:fillRef>
+          <a:effectRef idx="0">
+            <a:schemeClr val="accent1"/>
+          </a:effectRef>
+          <a:fontRef idx="minor">
+            <a:schemeClr val="tx1"/>
+          </a:fontRef>
+        </p:style>
+      </p:cxnSp>
+      <p:cxnSp>
+        <p:nvCxnSpPr>
+          <p:cNvPr id="23" name="Straight Arrow Connector 22">
+            <a:extLst>
+              <a:ext uri="{FF2B5EF4-FFF2-40B4-BE49-F238E27FC236}">
+                <a16:creationId xmlns:a16="http://schemas.microsoft.com/office/drawing/2014/main" id="{282F0445-9C36-AE46-AF66-47EB77E497BC}"/>
+              </a:ext>
+            </a:extLst>
+          </p:cNvPr>
+          <p:cNvCxnSpPr>
+            <a:stCxn id="13" idx="3"/>
+            <a:endCxn id="16" idx="2"/>
+          </p:cNvCxnSpPr>
+          <p:nvPr/>
+        </p:nvCxnSpPr>
+        <p:spPr>
+          <a:xfrm>
+            <a:off x="6485383" y="3392662"/>
+            <a:ext cx="539671" cy="80300"/>
+          </a:xfrm>
+          <a:prstGeom prst="straightConnector1">
+            <a:avLst/>
+          </a:prstGeom>
+          <a:ln>
+            <a:tailEnd type="triangle"/>
+          </a:ln>
+        </p:spPr>
+        <p:style>
+          <a:lnRef idx="2">
+            <a:schemeClr val="accent1"/>
+          </a:lnRef>
+          <a:fillRef idx="0">
+            <a:schemeClr val="accent1"/>
+          </a:fillRef>
+          <a:effectRef idx="1">
+            <a:schemeClr val="accent1"/>
+          </a:effectRef>
+          <a:fontRef idx="minor">
+            <a:schemeClr val="tx1"/>
+          </a:fontRef>
+        </p:style>
+      </p:cxnSp>
+      <p:cxnSp>
+        <p:nvCxnSpPr>
+          <p:cNvPr id="25" name="Straight Arrow Connector 24">
+            <a:extLst>
+              <a:ext uri="{FF2B5EF4-FFF2-40B4-BE49-F238E27FC236}">
+                <a16:creationId xmlns:a16="http://schemas.microsoft.com/office/drawing/2014/main" id="{F823F9F2-0B47-204F-A254-980008538DE0}"/>
+              </a:ext>
+            </a:extLst>
+          </p:cNvPr>
+          <p:cNvCxnSpPr>
+            <a:stCxn id="9" idx="4"/>
+            <a:endCxn id="11" idx="0"/>
+          </p:cNvCxnSpPr>
+          <p:nvPr/>
+        </p:nvCxnSpPr>
+        <p:spPr>
+          <a:xfrm>
+            <a:off x="2576146" y="1521069"/>
+            <a:ext cx="0" cy="271393"/>
+          </a:xfrm>
+          <a:prstGeom prst="straightConnector1">
+            <a:avLst/>
+          </a:prstGeom>
+          <a:ln>
+            <a:tailEnd type="triangle"/>
+          </a:ln>
+        </p:spPr>
+        <p:style>
+          <a:lnRef idx="1">
+            <a:schemeClr val="accent1"/>
+          </a:lnRef>
+          <a:fillRef idx="0">
+            <a:schemeClr val="accent1"/>
+          </a:fillRef>
+          <a:effectRef idx="0">
+            <a:schemeClr val="accent1"/>
+          </a:effectRef>
+          <a:fontRef idx="minor">
+            <a:schemeClr val="tx1"/>
+          </a:fontRef>
+        </p:style>
+      </p:cxnSp>
+      <p:cxnSp>
+        <p:nvCxnSpPr>
+          <p:cNvPr id="27" name="Straight Arrow Connector 26">
+            <a:extLst>
+              <a:ext uri="{FF2B5EF4-FFF2-40B4-BE49-F238E27FC236}">
+                <a16:creationId xmlns:a16="http://schemas.microsoft.com/office/drawing/2014/main" id="{E33DC2B8-F753-224B-B3F8-4409CBD59C35}"/>
+              </a:ext>
+            </a:extLst>
+          </p:cNvPr>
+          <p:cNvCxnSpPr>
+            <a:stCxn id="11" idx="4"/>
+          </p:cNvCxnSpPr>
+          <p:nvPr/>
+        </p:nvCxnSpPr>
+        <p:spPr>
+          <a:xfrm flipH="1">
+            <a:off x="2569580" y="2778369"/>
+            <a:ext cx="6566" cy="271393"/>
+          </a:xfrm>
+          <a:prstGeom prst="straightConnector1">
+            <a:avLst/>
+          </a:prstGeom>
+          <a:ln>
+            <a:tailEnd type="triangle"/>
+          </a:ln>
+        </p:spPr>
+        <p:style>
+          <a:lnRef idx="1">
+            <a:schemeClr val="accent1"/>
+          </a:lnRef>
+          <a:fillRef idx="0">
+            <a:schemeClr val="accent1"/>
+          </a:fillRef>
+          <a:effectRef idx="0">
+            <a:schemeClr val="accent1"/>
+          </a:effectRef>
+          <a:fontRef idx="minor">
+            <a:schemeClr val="tx1"/>
+          </a:fontRef>
+        </p:style>
+      </p:cxnSp>
+      <p:cxnSp>
+        <p:nvCxnSpPr>
+          <p:cNvPr id="29" name="Straight Arrow Connector 28">
+            <a:extLst>
+              <a:ext uri="{FF2B5EF4-FFF2-40B4-BE49-F238E27FC236}">
+                <a16:creationId xmlns:a16="http://schemas.microsoft.com/office/drawing/2014/main" id="{302D2AE3-DB7A-EC4A-BDC7-A5237A112828}"/>
+              </a:ext>
+            </a:extLst>
+          </p:cNvPr>
+          <p:cNvCxnSpPr>
+            <a:stCxn id="14" idx="4"/>
+            <a:endCxn id="15" idx="0"/>
+          </p:cNvCxnSpPr>
+          <p:nvPr/>
+        </p:nvCxnSpPr>
+        <p:spPr>
+          <a:xfrm flipH="1">
+            <a:off x="9284676" y="1597140"/>
+            <a:ext cx="1" cy="375203"/>
+          </a:xfrm>
+          <a:prstGeom prst="straightConnector1">
+            <a:avLst/>
+          </a:prstGeom>
+          <a:ln>
+            <a:tailEnd type="triangle"/>
+          </a:ln>
+        </p:spPr>
+        <p:style>
+          <a:lnRef idx="1">
+            <a:schemeClr val="accent1"/>
+          </a:lnRef>
+          <a:fillRef idx="0">
+            <a:schemeClr val="accent1"/>
+          </a:fillRef>
+          <a:effectRef idx="0">
+            <a:schemeClr val="accent1"/>
+          </a:effectRef>
+          <a:fontRef idx="minor">
+            <a:schemeClr val="tx1"/>
+          </a:fontRef>
+        </p:style>
+      </p:cxnSp>
+      <p:cxnSp>
+        <p:nvCxnSpPr>
+          <p:cNvPr id="31" name="Straight Arrow Connector 30">
+            <a:extLst>
+              <a:ext uri="{FF2B5EF4-FFF2-40B4-BE49-F238E27FC236}">
+                <a16:creationId xmlns:a16="http://schemas.microsoft.com/office/drawing/2014/main" id="{9B817099-BB27-F542-980B-A0DDECB52A9C}"/>
+              </a:ext>
+            </a:extLst>
+          </p:cNvPr>
+          <p:cNvCxnSpPr>
+            <a:stCxn id="15" idx="4"/>
+          </p:cNvCxnSpPr>
+          <p:nvPr/>
+        </p:nvCxnSpPr>
+        <p:spPr>
+          <a:xfrm>
+            <a:off x="9284676" y="2754858"/>
+            <a:ext cx="32944" cy="375204"/>
+          </a:xfrm>
+          <a:prstGeom prst="straightConnector1">
+            <a:avLst/>
+          </a:prstGeom>
+          <a:ln>
+            <a:tailEnd type="triangle"/>
+          </a:ln>
+        </p:spPr>
+        <p:style>
+          <a:lnRef idx="1">
+            <a:schemeClr val="accent1"/>
+          </a:lnRef>
+          <a:fillRef idx="0">
+            <a:schemeClr val="accent1"/>
+          </a:fillRef>
+          <a:effectRef idx="0">
+            <a:schemeClr val="accent1"/>
+          </a:effectRef>
+          <a:fontRef idx="minor">
+            <a:schemeClr val="tx1"/>
+          </a:fontRef>
+        </p:style>
+      </p:cxnSp>
+      <p:cxnSp>
+        <p:nvCxnSpPr>
+          <p:cNvPr id="33" name="Straight Arrow Connector 32">
+            <a:extLst>
+              <a:ext uri="{FF2B5EF4-FFF2-40B4-BE49-F238E27FC236}">
+                <a16:creationId xmlns:a16="http://schemas.microsoft.com/office/drawing/2014/main" id="{E8C9E7C4-A3AA-984E-819C-FF2130140A7B}"/>
+              </a:ext>
+            </a:extLst>
+          </p:cNvPr>
+          <p:cNvCxnSpPr>
+            <a:stCxn id="12" idx="4"/>
+            <a:endCxn id="6" idx="0"/>
+          </p:cNvCxnSpPr>
+          <p:nvPr/>
+        </p:nvCxnSpPr>
+        <p:spPr>
+          <a:xfrm>
+            <a:off x="2734407" y="3735562"/>
+            <a:ext cx="2945424" cy="730094"/>
+          </a:xfrm>
+          <a:prstGeom prst="straightConnector1">
+            <a:avLst/>
+          </a:prstGeom>
+          <a:ln>
+            <a:tailEnd type="triangle"/>
+          </a:ln>
+        </p:spPr>
+        <p:style>
+          <a:lnRef idx="1">
+            <a:schemeClr val="accent1"/>
+          </a:lnRef>
+          <a:fillRef idx="0">
+            <a:schemeClr val="accent1"/>
+          </a:fillRef>
+          <a:effectRef idx="0">
+            <a:schemeClr val="accent1"/>
+          </a:effectRef>
+          <a:fontRef idx="minor">
+            <a:schemeClr val="tx1"/>
+          </a:fontRef>
+        </p:style>
+      </p:cxnSp>
+      <p:cxnSp>
+        <p:nvCxnSpPr>
+          <p:cNvPr id="35" name="Straight Arrow Connector 34">
+            <a:extLst>
+              <a:ext uri="{FF2B5EF4-FFF2-40B4-BE49-F238E27FC236}">
+                <a16:creationId xmlns:a16="http://schemas.microsoft.com/office/drawing/2014/main" id="{F31251E1-E6D3-1A43-8268-40F00F1A8D1B}"/>
+              </a:ext>
+            </a:extLst>
+          </p:cNvPr>
+          <p:cNvCxnSpPr>
+            <a:stCxn id="16" idx="4"/>
+            <a:endCxn id="6" idx="0"/>
+          </p:cNvCxnSpPr>
+          <p:nvPr/>
+        </p:nvCxnSpPr>
+        <p:spPr>
+          <a:xfrm flipH="1">
+            <a:off x="5679831" y="3815862"/>
+            <a:ext cx="3499339" cy="649794"/>
+          </a:xfrm>
+          <a:prstGeom prst="straightConnector1">
+            <a:avLst/>
+          </a:prstGeom>
+          <a:ln>
+            <a:tailEnd type="triangle"/>
+          </a:ln>
+        </p:spPr>
+        <p:style>
+          <a:lnRef idx="1">
+            <a:schemeClr val="accent1"/>
+          </a:lnRef>
+          <a:fillRef idx="0">
+            <a:schemeClr val="accent1"/>
+          </a:fillRef>
+          <a:effectRef idx="0">
+            <a:schemeClr val="accent1"/>
+          </a:effectRef>
+          <a:fontRef idx="minor">
+            <a:schemeClr val="tx1"/>
+          </a:fontRef>
+        </p:style>
+      </p:cxnSp>
+      <p:cxnSp>
+        <p:nvCxnSpPr>
+          <p:cNvPr id="37" name="Straight Arrow Connector 36">
+            <a:extLst>
+              <a:ext uri="{FF2B5EF4-FFF2-40B4-BE49-F238E27FC236}">
+                <a16:creationId xmlns:a16="http://schemas.microsoft.com/office/drawing/2014/main" id="{7AE1CDE2-2A50-3147-BEFA-5D862C79F085}"/>
+              </a:ext>
+            </a:extLst>
+          </p:cNvPr>
+          <p:cNvCxnSpPr>
+            <a:stCxn id="6" idx="2"/>
+            <a:endCxn id="5" idx="0"/>
+          </p:cNvCxnSpPr>
+          <p:nvPr/>
+        </p:nvCxnSpPr>
+        <p:spPr>
+          <a:xfrm>
+            <a:off x="5679831" y="5010779"/>
+            <a:ext cx="0" cy="537167"/>
+          </a:xfrm>
+          <a:prstGeom prst="straightConnector1">
+            <a:avLst/>
+          </a:prstGeom>
+          <a:ln>
+            <a:tailEnd type="triangle"/>
+          </a:ln>
+        </p:spPr>
+        <p:style>
+          <a:lnRef idx="1">
+            <a:schemeClr val="accent1"/>
+          </a:lnRef>
+          <a:fillRef idx="0">
+            <a:schemeClr val="accent1"/>
+          </a:fillRef>
+          <a:effectRef idx="0">
+            <a:schemeClr val="accent1"/>
+          </a:effectRef>
+          <a:fontRef idx="minor">
+            <a:schemeClr val="tx1"/>
+          </a:fontRef>
+        </p:style>
+      </p:cxnSp>
     </p:spTree>
     <p:extLst>
       <p:ext uri="{BB962C8B-B14F-4D97-AF65-F5344CB8AC3E}">

</xml_diff>